<commit_message>
further dev on präsentation of bachelor examination
further dev on präsentation of bachelor examination
</commit_message>
<xml_diff>
--- a/doc/Präsentationen/Herzog_Thomas_Päsentation_part_Bachelorprüfung.pptx
+++ b/doc/Präsentationen/Herzog_Thomas_Päsentation_part_Bachelorprüfung.pptx
@@ -10,14 +10,14 @@
   <p:sldIdLst>
     <p:sldId id="256" r:id="rId2"/>
     <p:sldId id="266" r:id="rId3"/>
-    <p:sldId id="267" r:id="rId4"/>
-    <p:sldId id="257" r:id="rId5"/>
-    <p:sldId id="264" r:id="rId6"/>
-    <p:sldId id="258" r:id="rId7"/>
-    <p:sldId id="259" r:id="rId8"/>
-    <p:sldId id="260" r:id="rId9"/>
-    <p:sldId id="262" r:id="rId10"/>
-    <p:sldId id="263" r:id="rId11"/>
+    <p:sldId id="269" r:id="rId4"/>
+    <p:sldId id="268" r:id="rId5"/>
+    <p:sldId id="267" r:id="rId6"/>
+    <p:sldId id="257" r:id="rId7"/>
+    <p:sldId id="264" r:id="rId8"/>
+    <p:sldId id="258" r:id="rId9"/>
+    <p:sldId id="259" r:id="rId10"/>
+    <p:sldId id="262" r:id="rId11"/>
     <p:sldId id="265" r:id="rId12"/>
   </p:sldIdLst>
   <p:sldSz cx="12192000" cy="6858000"/>
@@ -224,7 +224,7 @@
           <a:p>
             <a:fld id="{300AC8D6-5F1B-43CC-81CB-9EBBEF596CC8}" type="datetimeFigureOut">
               <a:rPr lang="de-DE" smtClean="0"/>
-              <a:t>24.08.2016</a:t>
+              <a:t>13.09.2016</a:t>
             </a:fld>
             <a:endParaRPr lang="de-DE"/>
           </a:p>
@@ -679,7 +679,7 @@
           <a:p>
             <a:fld id="{C9CFED7A-897F-4F5B-9F1B-004B8668C128}" type="datetime1">
               <a:rPr lang="en-US" smtClean="0"/>
-              <a:t>8/24/2016</a:t>
+              <a:t>9/13/2016</a:t>
             </a:fld>
             <a:endParaRPr lang="en-US" dirty="0"/>
           </a:p>
@@ -1018,7 +1018,7 @@
           <a:p>
             <a:fld id="{CD3BD0FE-530E-439D-B262-30C3C388AAE2}" type="datetime1">
               <a:rPr lang="en-US" smtClean="0"/>
-              <a:t>8/24/2016</a:t>
+              <a:t>9/13/2016</a:t>
             </a:fld>
             <a:endParaRPr lang="en-US" dirty="0"/>
           </a:p>
@@ -1420,7 +1420,7 @@
           <a:p>
             <a:fld id="{C8BD7306-DEA0-4F14-BF8D-D5670B0C538D}" type="datetime1">
               <a:rPr lang="en-US" smtClean="0"/>
-              <a:t>8/24/2016</a:t>
+              <a:t>9/13/2016</a:t>
             </a:fld>
             <a:endParaRPr lang="en-US" dirty="0"/>
           </a:p>
@@ -1783,7 +1783,7 @@
           <a:p>
             <a:fld id="{609E5908-2DF8-4F8A-B1D6-FEC56333ACDA}" type="datetime1">
               <a:rPr lang="en-US" smtClean="0"/>
-              <a:t>8/24/2016</a:t>
+              <a:t>9/13/2016</a:t>
             </a:fld>
             <a:endParaRPr lang="en-US" dirty="0"/>
           </a:p>
@@ -2104,7 +2104,7 @@
           <a:p>
             <a:fld id="{90B844D9-F51B-48D8-A03E-AC807F931A5B}" type="datetime1">
               <a:rPr lang="en-US" smtClean="0"/>
-              <a:t>8/24/2016</a:t>
+              <a:t>9/13/2016</a:t>
             </a:fld>
             <a:endParaRPr lang="en-US" dirty="0"/>
           </a:p>
@@ -2501,7 +2501,7 @@
           <a:p>
             <a:fld id="{2530F9BD-B664-47E4-A81F-485D647144AB}" type="datetime1">
               <a:rPr lang="en-US" smtClean="0"/>
-              <a:t>8/24/2016</a:t>
+              <a:t>9/13/2016</a:t>
             </a:fld>
             <a:endParaRPr lang="en-US" dirty="0"/>
           </a:p>
@@ -2759,7 +2759,7 @@
           <a:p>
             <a:fld id="{F3C7DE7B-97B9-4565-890C-BD1F8CD4D74B}" type="datetime1">
               <a:rPr lang="en-US" smtClean="0"/>
-              <a:t>8/24/2016</a:t>
+              <a:t>9/13/2016</a:t>
             </a:fld>
             <a:endParaRPr lang="en-US" dirty="0"/>
           </a:p>
@@ -3022,7 +3022,7 @@
           <a:p>
             <a:fld id="{BFE967F1-89A7-471D-95B2-F0608E061AB2}" type="datetime1">
               <a:rPr lang="en-US" smtClean="0"/>
-              <a:t>8/24/2016</a:t>
+              <a:t>9/13/2016</a:t>
             </a:fld>
             <a:endParaRPr lang="en-US" dirty="0"/>
           </a:p>
@@ -3285,7 +3285,7 @@
           <a:p>
             <a:fld id="{CE1D36F5-BCAF-4814-B1E0-3880CF115A39}" type="datetime1">
               <a:rPr lang="en-US" smtClean="0"/>
-              <a:t>8/24/2016</a:t>
+              <a:t>9/13/2016</a:t>
             </a:fld>
             <a:endParaRPr lang="en-US" dirty="0"/>
           </a:p>
@@ -3615,7 +3615,7 @@
           <a:p>
             <a:fld id="{B26AB869-F3BD-4BE3-B249-CD66AEAFAB45}" type="datetime1">
               <a:rPr lang="en-US" smtClean="0"/>
-              <a:t>8/24/2016</a:t>
+              <a:t>9/13/2016</a:t>
             </a:fld>
             <a:endParaRPr lang="en-US" dirty="0"/>
           </a:p>
@@ -3939,7 +3939,7 @@
           <a:p>
             <a:fld id="{5178BAB9-BF9B-4705-933A-2B0D8C5BA6BD}" type="datetime1">
               <a:rPr lang="en-US" smtClean="0"/>
-              <a:t>8/24/2016</a:t>
+              <a:t>9/13/2016</a:t>
             </a:fld>
             <a:endParaRPr lang="en-US" dirty="0"/>
           </a:p>
@@ -4397,7 +4397,7 @@
           <a:p>
             <a:fld id="{9E66E724-E8AB-49E5-A77D-01704923EAE2}" type="datetime1">
               <a:rPr lang="en-US" smtClean="0"/>
-              <a:t>8/24/2016</a:t>
+              <a:t>9/13/2016</a:t>
             </a:fld>
             <a:endParaRPr lang="en-US" dirty="0"/>
           </a:p>
@@ -4603,7 +4603,7 @@
           <a:p>
             <a:fld id="{8E95EFD9-36CE-4FDD-9A77-3666FD6ABA7A}" type="datetime1">
               <a:rPr lang="en-US" smtClean="0"/>
-              <a:t>8/24/2016</a:t>
+              <a:t>9/13/2016</a:t>
             </a:fld>
             <a:endParaRPr lang="en-US" dirty="0"/>
           </a:p>
@@ -4781,7 +4781,7 @@
           <a:p>
             <a:fld id="{CD235D2F-F939-4122-B9DD-548F5AD01693}" type="datetime1">
               <a:rPr lang="en-US" smtClean="0"/>
-              <a:t>8/24/2016</a:t>
+              <a:t>9/13/2016</a:t>
             </a:fld>
             <a:endParaRPr lang="en-US" dirty="0"/>
           </a:p>
@@ -5115,7 +5115,7 @@
           <a:p>
             <a:fld id="{07864037-E751-4535-A323-69C87E8D6896}" type="datetime1">
               <a:rPr lang="en-US" smtClean="0"/>
-              <a:t>8/24/2016</a:t>
+              <a:t>9/13/2016</a:t>
             </a:fld>
             <a:endParaRPr lang="en-US" dirty="0"/>
           </a:p>
@@ -5461,7 +5461,7 @@
           <a:p>
             <a:fld id="{52D5CD0D-2338-4F10-96FF-002347A8CBA1}" type="datetime1">
               <a:rPr lang="en-US" smtClean="0"/>
-              <a:t>8/24/2016</a:t>
+              <a:t>9/13/2016</a:t>
             </a:fld>
             <a:endParaRPr lang="en-US" dirty="0"/>
           </a:p>
@@ -7579,7 +7579,7 @@
           <a:p>
             <a:fld id="{F73A2BA8-E317-40BB-9ABB-FD49EA25F4D8}" type="datetime1">
               <a:rPr lang="en-US" smtClean="0"/>
-              <a:t>8/24/2016</a:t>
+              <a:t>9/13/2016</a:t>
             </a:fld>
             <a:endParaRPr lang="en-US" dirty="0"/>
           </a:p>
@@ -8145,7 +8145,7 @@
         </p:nvSpPr>
         <p:spPr>
           <a:xfrm>
-            <a:off x="2392295" y="2341289"/>
+            <a:off x="2158416" y="1963785"/>
             <a:ext cx="8915400" cy="2387546"/>
           </a:xfrm>
         </p:spPr>
@@ -8166,7 +8166,23 @@
                   <a:schemeClr val="tx1"/>
                 </a:solidFill>
               </a:rPr>
-              <a:t>Author:    Thomas Herzog - S1310307011</a:t>
+              <a:t>Author:    </a:t>
+            </a:r>
+            <a:r>
+              <a:rPr lang="en-US" sz="2000" dirty="0" err="1">
+                <a:solidFill>
+                  <a:schemeClr val="tx1"/>
+                </a:solidFill>
+              </a:rPr>
+              <a:t>Ing</a:t>
+            </a:r>
+            <a:r>
+              <a:rPr lang="en-US" sz="2000" dirty="0">
+                <a:solidFill>
+                  <a:schemeClr val="tx1"/>
+                </a:solidFill>
+              </a:rPr>
+              <a:t>. Thomas Herzog - S1310307011</a:t>
             </a:r>
           </a:p>
           <a:p>
@@ -8204,7 +8220,23 @@
                   <a:schemeClr val="tx1"/>
                 </a:solidFill>
               </a:rPr>
-              <a:t>Firma:      Curecomp Software Services GmbH</a:t>
+              <a:t>Firma:      </a:t>
+            </a:r>
+            <a:r>
+              <a:rPr lang="en-US" sz="2000" dirty="0" err="1">
+                <a:solidFill>
+                  <a:schemeClr val="tx1"/>
+                </a:solidFill>
+              </a:rPr>
+              <a:t>curecomp</a:t>
+            </a:r>
+            <a:r>
+              <a:rPr lang="en-US" sz="2000" dirty="0">
+                <a:solidFill>
+                  <a:schemeClr val="tx1"/>
+                </a:solidFill>
+              </a:rPr>
+              <a:t> Software Services GmbH</a:t>
             </a:r>
           </a:p>
         </p:txBody>
@@ -8317,70 +8349,19 @@
           <a:p>
             <a:pPr algn="ctr"/>
             <a:r>
-              <a:rPr lang="de-DE" i="1" dirty="0" err="1"/>
-              <a:t>CleverMail</a:t>
+              <a:rPr lang="de-DE" i="1" dirty="0"/>
+              <a:t>E-Mail</a:t>
             </a:r>
             <a:r>
               <a:rPr lang="de-DE" dirty="0"/>
-              <a:t> Datenbankschema</a:t>
-            </a:r>
-          </a:p>
-        </p:txBody>
-      </p:sp>
-      <p:sp>
-        <p:nvSpPr>
-          <p:cNvPr id="5" name="Textplatzhalter 8"/>
-          <p:cNvSpPr>
-            <a:spLocks noGrp="1"/>
-          </p:cNvSpPr>
-          <p:nvPr>
-            <p:ph type="body" idx="1"/>
-          </p:nvPr>
-        </p:nvSpPr>
-        <p:spPr>
-          <a:xfrm>
-            <a:off x="2589212" y="6444000"/>
-            <a:ext cx="9413188" cy="273600"/>
-          </a:xfrm>
-        </p:spPr>
-        <p:txBody>
-          <a:bodyPr anchor="t">
-            <a:normAutofit fontScale="47500" lnSpcReduction="20000"/>
-          </a:bodyPr>
-          <a:lstStyle/>
-          <a:p>
-            <a:pPr>
-              <a:lnSpc>
-                <a:spcPct val="110000"/>
-              </a:lnSpc>
-            </a:pPr>
-            <a:endParaRPr lang="de-DE" sz="2500" dirty="0"/>
-          </a:p>
-          <a:p>
-            <a:pPr marL="457200" indent="-457200">
-              <a:lnSpc>
-                <a:spcPct val="110000"/>
-              </a:lnSpc>
-              <a:buFont typeface="Arial" panose="020B0604020202020204" pitchFamily="34" charset="0"/>
-              <a:buChar char="•"/>
-            </a:pPr>
-            <a:endParaRPr lang="de-DE" sz="2500" dirty="0"/>
-          </a:p>
-          <a:p>
-            <a:pPr marL="457200" indent="-457200">
-              <a:lnSpc>
-                <a:spcPct val="110000"/>
-              </a:lnSpc>
-              <a:buFont typeface="Arial" panose="020B0604020202020204" pitchFamily="34" charset="0"/>
-              <a:buChar char="•"/>
-            </a:pPr>
-            <a:endParaRPr lang="de-DE" sz="2500" dirty="0"/>
-          </a:p>
-        </p:txBody>
-      </p:sp>
-      <p:sp>
-        <p:nvSpPr>
-          <p:cNvPr id="7" name="Foliennummernplatzhalter 6"/>
+              <a:t>-Vorlagen</a:t>
+            </a:r>
+          </a:p>
+        </p:txBody>
+      </p:sp>
+      <p:sp>
+        <p:nvSpPr>
+          <p:cNvPr id="6" name="Foliennummernplatzhalter 5"/>
           <p:cNvSpPr>
             <a:spLocks noGrp="1"/>
           </p:cNvSpPr>
@@ -8402,9 +8383,170 @@
           </a:p>
         </p:txBody>
       </p:sp>
+      <p:sp>
+        <p:nvSpPr>
+          <p:cNvPr id="8" name="Textplatzhalter 2"/>
+          <p:cNvSpPr>
+            <a:spLocks noGrp="1"/>
+          </p:cNvSpPr>
+          <p:nvPr>
+            <p:ph type="body" idx="1"/>
+          </p:nvPr>
+        </p:nvSpPr>
+        <p:spPr>
+          <a:xfrm>
+            <a:off x="7264606" y="990600"/>
+            <a:ext cx="4851194" cy="5753100"/>
+          </a:xfrm>
+        </p:spPr>
+        <p:txBody>
+          <a:bodyPr anchor="t">
+            <a:normAutofit/>
+          </a:bodyPr>
+          <a:lstStyle/>
+          <a:p>
+            <a:pPr marL="342900" indent="-342900">
+              <a:lnSpc>
+                <a:spcPct val="150000"/>
+              </a:lnSpc>
+              <a:buClrTx/>
+              <a:buFont typeface="Arial" panose="020B0604020202020204" pitchFamily="34" charset="0"/>
+              <a:buChar char="•"/>
+            </a:pPr>
+            <a:r>
+              <a:rPr lang="de-DE" sz="2000" dirty="0">
+                <a:solidFill>
+                  <a:schemeClr val="tx1"/>
+                </a:solidFill>
+              </a:rPr>
+              <a:t>Statische vorgegebene Variablen</a:t>
+            </a:r>
+          </a:p>
+          <a:p>
+            <a:pPr marL="342900" indent="-342900">
+              <a:lnSpc>
+                <a:spcPct val="150000"/>
+              </a:lnSpc>
+              <a:buClrTx/>
+              <a:buFont typeface="Arial" panose="020B0604020202020204" pitchFamily="34" charset="0"/>
+              <a:buChar char="•"/>
+            </a:pPr>
+            <a:r>
+              <a:rPr lang="de-DE" sz="2000" dirty="0">
+                <a:solidFill>
+                  <a:schemeClr val="tx1"/>
+                </a:solidFill>
+              </a:rPr>
+              <a:t>Variablen beliebig verwendbar in Vorlagen</a:t>
+            </a:r>
+          </a:p>
+          <a:p>
+            <a:pPr marL="342900" indent="-342900">
+              <a:lnSpc>
+                <a:spcPct val="150000"/>
+              </a:lnSpc>
+              <a:buClrTx/>
+              <a:buFont typeface="Arial" panose="020B0604020202020204" pitchFamily="34" charset="0"/>
+              <a:buChar char="•"/>
+            </a:pPr>
+            <a:r>
+              <a:rPr lang="de-DE" sz="2000" dirty="0">
+                <a:solidFill>
+                  <a:schemeClr val="tx1"/>
+                </a:solidFill>
+              </a:rPr>
+              <a:t>Trennung der Vorlage von den dynamische Daten</a:t>
+            </a:r>
+          </a:p>
+          <a:p>
+            <a:pPr marL="342900" indent="-342900">
+              <a:lnSpc>
+                <a:spcPct val="150000"/>
+              </a:lnSpc>
+              <a:buClrTx/>
+              <a:buFont typeface="Arial" panose="020B0604020202020204" pitchFamily="34" charset="0"/>
+              <a:buChar char="•"/>
+            </a:pPr>
+            <a:r>
+              <a:rPr lang="de-DE" sz="2000" dirty="0">
+                <a:solidFill>
+                  <a:schemeClr val="tx1"/>
+                </a:solidFill>
+              </a:rPr>
+              <a:t>Benutzerdefinierte Vorlagen</a:t>
+            </a:r>
+          </a:p>
+          <a:p>
+            <a:pPr marL="342900" indent="-342900">
+              <a:lnSpc>
+                <a:spcPct val="150000"/>
+              </a:lnSpc>
+              <a:buClrTx/>
+              <a:buFont typeface="Arial" panose="020B0604020202020204" pitchFamily="34" charset="0"/>
+              <a:buChar char="•"/>
+            </a:pPr>
+            <a:r>
+              <a:rPr lang="de-DE" sz="2000" dirty="0">
+                <a:solidFill>
+                  <a:schemeClr val="tx1"/>
+                </a:solidFill>
+              </a:rPr>
+              <a:t>Vorlagen zur Laufzeit änderbar</a:t>
+            </a:r>
+          </a:p>
+          <a:p>
+            <a:pPr marL="342900" indent="-342900">
+              <a:lnSpc>
+                <a:spcPct val="150000"/>
+              </a:lnSpc>
+              <a:buClrTx/>
+              <a:buFont typeface="Arial" panose="020B0604020202020204" pitchFamily="34" charset="0"/>
+              <a:buChar char="•"/>
+            </a:pPr>
+            <a:r>
+              <a:rPr lang="de-DE" sz="2000" dirty="0">
+                <a:solidFill>
+                  <a:schemeClr val="tx1"/>
+                </a:solidFill>
+              </a:rPr>
+              <a:t>Mehrsprachigkeit der Vorlagen</a:t>
+            </a:r>
+          </a:p>
+          <a:p>
+            <a:pPr marL="342900" indent="-342900">
+              <a:lnSpc>
+                <a:spcPct val="150000"/>
+              </a:lnSpc>
+              <a:buClrTx/>
+              <a:buFont typeface="Arial" panose="020B0604020202020204" pitchFamily="34" charset="0"/>
+              <a:buChar char="•"/>
+            </a:pPr>
+            <a:endParaRPr lang="de-DE" sz="2000" dirty="0">
+              <a:solidFill>
+                <a:schemeClr val="tx1"/>
+              </a:solidFill>
+            </a:endParaRPr>
+          </a:p>
+          <a:p>
+            <a:pPr marL="342900" indent="-342900">
+              <a:lnSpc>
+                <a:spcPct val="150000"/>
+              </a:lnSpc>
+              <a:buClrTx/>
+              <a:buFont typeface="Arial" panose="020B0604020202020204" pitchFamily="34" charset="0"/>
+              <a:buChar char="•"/>
+            </a:pPr>
+            <a:endParaRPr lang="de-DE" sz="2000" dirty="0">
+              <a:solidFill>
+                <a:schemeClr val="tx1"/>
+              </a:solidFill>
+            </a:endParaRPr>
+          </a:p>
+        </p:txBody>
+      </p:sp>
       <p:pic>
         <p:nvPicPr>
-          <p:cNvPr id="3" name="Grafik 2"/>
+          <p:cNvPr id="4" name="Grafik 3"/>
           <p:cNvPicPr>
             <a:picLocks noChangeAspect="1"/>
           </p:cNvPicPr>
@@ -8418,8 +8560,8 @@
         </p:blipFill>
         <p:spPr>
           <a:xfrm>
-            <a:off x="1676400" y="990600"/>
-            <a:ext cx="10515600" cy="5823492"/>
+            <a:off x="1676400" y="1297832"/>
+            <a:ext cx="5471130" cy="4262336"/>
           </a:xfrm>
           <a:prstGeom prst="rect">
             <a:avLst/>
@@ -8429,7 +8571,7 @@
     </p:spTree>
     <p:extLst>
       <p:ext uri="{BB962C8B-B14F-4D97-AF65-F5344CB8AC3E}">
-        <p14:creationId xmlns:p14="http://schemas.microsoft.com/office/powerpoint/2010/main" val="1156336460"/>
+        <p14:creationId xmlns:p14="http://schemas.microsoft.com/office/powerpoint/2010/main" val="3173056318"/>
       </p:ext>
     </p:extLst>
   </p:cSld>
@@ -8850,6 +8992,40 @@
                 </a:solidFill>
               </a:rPr>
               <a:t>Ein unabhängiges Datenmodel</a:t>
+            </a:r>
+          </a:p>
+          <a:p>
+            <a:pPr>
+              <a:lnSpc>
+                <a:spcPct val="150000"/>
+              </a:lnSpc>
+              <a:buClrTx/>
+              <a:buFont typeface="Arial" panose="020B0604020202020204" pitchFamily="34" charset="0"/>
+              <a:buChar char="•"/>
+            </a:pPr>
+            <a:r>
+              <a:rPr lang="de-DE" sz="2000" dirty="0">
+                <a:solidFill>
+                  <a:schemeClr val="tx1"/>
+                </a:solidFill>
+              </a:rPr>
+              <a:t>Mit Java 8 implementiert (</a:t>
+            </a:r>
+            <a:r>
+              <a:rPr lang="de-DE" sz="2000" i="1" dirty="0">
+                <a:solidFill>
+                  <a:schemeClr val="tx1"/>
+                </a:solidFill>
+              </a:rPr>
+              <a:t>Lambda</a:t>
+            </a:r>
+            <a:r>
+              <a:rPr lang="de-DE" sz="2000" dirty="0">
+                <a:solidFill>
+                  <a:schemeClr val="tx1"/>
+                </a:solidFill>
+              </a:rPr>
+              <a:t>-Ausdrücke, Methodenreferenzen, …)</a:t>
             </a:r>
           </a:p>
           <a:p>
@@ -9014,11 +9190,11 @@
             <a:pPr algn="ctr"/>
             <a:r>
               <a:rPr lang="de-DE" dirty="0"/>
-              <a:t>Systemaufbau </a:t>
+              <a:t>Softwaresystem </a:t>
             </a:r>
             <a:r>
               <a:rPr lang="de-DE" i="1" dirty="0" err="1"/>
-              <a:t>CCMail</a:t>
+              <a:t>clevercure</a:t>
             </a:r>
             <a:endParaRPr lang="de-DE" i="1" dirty="0"/>
           </a:p>
@@ -9048,9 +9224,219 @@
           </a:p>
         </p:txBody>
       </p:sp>
+      <p:sp>
+        <p:nvSpPr>
+          <p:cNvPr id="11" name="Textplatzhalter 8"/>
+          <p:cNvSpPr>
+            <a:spLocks noGrp="1"/>
+          </p:cNvSpPr>
+          <p:nvPr>
+            <p:ph type="body" idx="1"/>
+          </p:nvPr>
+        </p:nvSpPr>
+        <p:spPr>
+          <a:xfrm>
+            <a:off x="1676400" y="3835024"/>
+            <a:ext cx="9413188" cy="3022976"/>
+          </a:xfrm>
+        </p:spPr>
+        <p:txBody>
+          <a:bodyPr anchor="t">
+            <a:normAutofit/>
+          </a:bodyPr>
+          <a:lstStyle/>
+          <a:p>
+            <a:pPr marL="457200" indent="-457200">
+              <a:lnSpc>
+                <a:spcPct val="110000"/>
+              </a:lnSpc>
+              <a:buClr>
+                <a:schemeClr val="tx1"/>
+              </a:buClr>
+              <a:buFont typeface="Arial" panose="020B0604020202020204" pitchFamily="34" charset="0"/>
+              <a:buChar char="•"/>
+            </a:pPr>
+            <a:r>
+              <a:rPr lang="de-DE" sz="2000" dirty="0">
+                <a:solidFill>
+                  <a:schemeClr val="tx1"/>
+                </a:solidFill>
+              </a:rPr>
+              <a:t>SRM (</a:t>
+            </a:r>
+            <a:r>
+              <a:rPr lang="de-DE" sz="2000" i="1" dirty="0">
+                <a:solidFill>
+                  <a:schemeClr val="tx1"/>
+                </a:solidFill>
+              </a:rPr>
+              <a:t>Supplier </a:t>
+            </a:r>
+            <a:r>
+              <a:rPr lang="de-DE" sz="2000" i="1" dirty="0" err="1">
+                <a:solidFill>
+                  <a:schemeClr val="tx1"/>
+                </a:solidFill>
+              </a:rPr>
+              <a:t>Relationship</a:t>
+            </a:r>
+            <a:r>
+              <a:rPr lang="de-DE" sz="2000" i="1" dirty="0">
+                <a:solidFill>
+                  <a:schemeClr val="tx1"/>
+                </a:solidFill>
+              </a:rPr>
+              <a:t> Management</a:t>
+            </a:r>
+            <a:r>
+              <a:rPr lang="de-DE" sz="2000" dirty="0">
+                <a:solidFill>
+                  <a:schemeClr val="tx1"/>
+                </a:solidFill>
+              </a:rPr>
+              <a:t>)</a:t>
+            </a:r>
+          </a:p>
+          <a:p>
+            <a:pPr marL="457200" indent="-457200">
+              <a:lnSpc>
+                <a:spcPct val="110000"/>
+              </a:lnSpc>
+              <a:buClr>
+                <a:schemeClr val="tx1"/>
+              </a:buClr>
+              <a:buFont typeface="Arial" panose="020B0604020202020204" pitchFamily="34" charset="0"/>
+              <a:buChar char="•"/>
+            </a:pPr>
+            <a:r>
+              <a:rPr lang="de-DE" sz="2000" dirty="0">
+                <a:solidFill>
+                  <a:schemeClr val="tx1"/>
+                </a:solidFill>
+              </a:rPr>
+              <a:t>Kunde &lt;–&gt; </a:t>
+            </a:r>
+            <a:r>
+              <a:rPr lang="de-DE" sz="2000" i="1" dirty="0" err="1">
+                <a:solidFill>
+                  <a:schemeClr val="tx1"/>
+                </a:solidFill>
+              </a:rPr>
+              <a:t>clevercure</a:t>
+            </a:r>
+            <a:r>
+              <a:rPr lang="de-DE" sz="2000" dirty="0">
+                <a:solidFill>
+                  <a:schemeClr val="tx1"/>
+                </a:solidFill>
+              </a:rPr>
+              <a:t> &lt;–&gt; Lieferant</a:t>
+            </a:r>
+          </a:p>
+          <a:p>
+            <a:pPr marL="457200" indent="-457200">
+              <a:lnSpc>
+                <a:spcPct val="110000"/>
+              </a:lnSpc>
+              <a:buClr>
+                <a:schemeClr val="tx1"/>
+              </a:buClr>
+              <a:buFont typeface="Arial" panose="020B0604020202020204" pitchFamily="34" charset="0"/>
+              <a:buChar char="•"/>
+            </a:pPr>
+            <a:r>
+              <a:rPr lang="de-DE" sz="2000" i="1" dirty="0">
+                <a:solidFill>
+                  <a:schemeClr val="tx1"/>
+                </a:solidFill>
+              </a:rPr>
+              <a:t>E-Mail</a:t>
+            </a:r>
+            <a:r>
+              <a:rPr lang="de-DE" sz="2000" dirty="0">
+                <a:solidFill>
+                  <a:schemeClr val="tx1"/>
+                </a:solidFill>
+              </a:rPr>
+              <a:t>-Nachrichten essentiell</a:t>
+            </a:r>
+          </a:p>
+          <a:p>
+            <a:pPr marL="914400" lvl="1" indent="-457200">
+              <a:lnSpc>
+                <a:spcPct val="110000"/>
+              </a:lnSpc>
+              <a:buClr>
+                <a:schemeClr val="tx1"/>
+              </a:buClr>
+              <a:buFont typeface="Arial" panose="020B0604020202020204" pitchFamily="34" charset="0"/>
+              <a:buChar char="•"/>
+            </a:pPr>
+            <a:r>
+              <a:rPr lang="de-DE" sz="2000" dirty="0">
+                <a:solidFill>
+                  <a:schemeClr val="tx1"/>
+                </a:solidFill>
+              </a:rPr>
+              <a:t>Bestellung erfasst</a:t>
+            </a:r>
+          </a:p>
+          <a:p>
+            <a:pPr marL="914400" lvl="1" indent="-457200">
+              <a:lnSpc>
+                <a:spcPct val="110000"/>
+              </a:lnSpc>
+              <a:buClr>
+                <a:schemeClr val="tx1"/>
+              </a:buClr>
+              <a:buFont typeface="Arial" panose="020B0604020202020204" pitchFamily="34" charset="0"/>
+              <a:buChar char="•"/>
+            </a:pPr>
+            <a:r>
+              <a:rPr lang="de-DE" sz="2000" dirty="0">
+                <a:solidFill>
+                  <a:schemeClr val="tx1"/>
+                </a:solidFill>
+              </a:rPr>
+              <a:t>Speditionsauftrag erfasst</a:t>
+            </a:r>
+          </a:p>
+          <a:p>
+            <a:pPr marL="914400" lvl="1" indent="-457200">
+              <a:lnSpc>
+                <a:spcPct val="110000"/>
+              </a:lnSpc>
+              <a:buClr>
+                <a:schemeClr val="tx1"/>
+              </a:buClr>
+              <a:buFont typeface="Arial" panose="020B0604020202020204" pitchFamily="34" charset="0"/>
+              <a:buChar char="•"/>
+            </a:pPr>
+            <a:r>
+              <a:rPr lang="de-DE" sz="2000" dirty="0">
+                <a:solidFill>
+                  <a:schemeClr val="tx1"/>
+                </a:solidFill>
+              </a:rPr>
+              <a:t>…</a:t>
+            </a:r>
+            <a:endParaRPr lang="de-DE" sz="2000" dirty="0"/>
+          </a:p>
+          <a:p>
+            <a:pPr marL="457200" indent="-457200">
+              <a:lnSpc>
+                <a:spcPct val="110000"/>
+              </a:lnSpc>
+              <a:buFont typeface="Arial" panose="020B0604020202020204" pitchFamily="34" charset="0"/>
+              <a:buChar char="•"/>
+            </a:pPr>
+            <a:endParaRPr lang="de-DE" sz="2500" dirty="0"/>
+          </a:p>
+        </p:txBody>
+      </p:sp>
       <p:pic>
         <p:nvPicPr>
-          <p:cNvPr id="9" name="Grafik 8"/>
+          <p:cNvPr id="12" name="Grafik 11"/>
           <p:cNvPicPr>
             <a:picLocks noChangeAspect="1"/>
           </p:cNvPicPr>
@@ -9064,327 +9450,14 @@
         </p:blipFill>
         <p:spPr>
           <a:xfrm>
-            <a:off x="1676400" y="1315324"/>
-            <a:ext cx="4687720" cy="4227352"/>
+            <a:off x="2713072" y="990600"/>
+            <a:ext cx="6765856" cy="2764088"/>
           </a:xfrm>
           <a:prstGeom prst="rect">
             <a:avLst/>
           </a:prstGeom>
         </p:spPr>
       </p:pic>
-      <p:sp>
-        <p:nvSpPr>
-          <p:cNvPr id="10" name="Textplatzhalter 2"/>
-          <p:cNvSpPr>
-            <a:spLocks noGrp="1"/>
-          </p:cNvSpPr>
-          <p:nvPr>
-            <p:ph type="body" idx="1"/>
-          </p:nvPr>
-        </p:nvSpPr>
-        <p:spPr>
-          <a:xfrm>
-            <a:off x="6484690" y="990600"/>
-            <a:ext cx="5707310" cy="5777158"/>
-          </a:xfrm>
-        </p:spPr>
-        <p:txBody>
-          <a:bodyPr anchor="t">
-            <a:normAutofit/>
-          </a:bodyPr>
-          <a:lstStyle/>
-          <a:p>
-            <a:pPr marL="457200" indent="-457200">
-              <a:lnSpc>
-                <a:spcPct val="150000"/>
-              </a:lnSpc>
-              <a:buClr>
-                <a:schemeClr val="tx1"/>
-              </a:buClr>
-              <a:buFont typeface="Arial" panose="020B0604020202020204" pitchFamily="34" charset="0"/>
-              <a:buChar char="•"/>
-            </a:pPr>
-            <a:r>
-              <a:rPr lang="de-DE" sz="2000" dirty="0">
-                <a:solidFill>
-                  <a:schemeClr val="tx1"/>
-                </a:solidFill>
-              </a:rPr>
-              <a:t>In Java 1.4 implementiert</a:t>
-            </a:r>
-          </a:p>
-          <a:p>
-            <a:pPr marL="457200" indent="-457200">
-              <a:lnSpc>
-                <a:spcPct val="150000"/>
-              </a:lnSpc>
-              <a:buClr>
-                <a:schemeClr val="tx1"/>
-              </a:buClr>
-              <a:buFont typeface="Arial" panose="020B0604020202020204" pitchFamily="34" charset="0"/>
-              <a:buChar char="•"/>
-            </a:pPr>
-            <a:r>
-              <a:rPr lang="de-DE" sz="2000" dirty="0">
-                <a:solidFill>
-                  <a:schemeClr val="tx1"/>
-                </a:solidFill>
-              </a:rPr>
-              <a:t>Stätig gewachsen aber nie </a:t>
-            </a:r>
-            <a:r>
-              <a:rPr lang="de-DE" sz="2000" dirty="0" err="1">
-                <a:solidFill>
-                  <a:schemeClr val="tx1"/>
-                </a:solidFill>
-              </a:rPr>
-              <a:t>evolutioniert</a:t>
-            </a:r>
-            <a:endParaRPr lang="de-DE" sz="2000" dirty="0">
-              <a:solidFill>
-                <a:schemeClr val="tx1"/>
-              </a:solidFill>
-            </a:endParaRPr>
-          </a:p>
-          <a:p>
-            <a:pPr marL="457200" indent="-457200">
-              <a:lnSpc>
-                <a:spcPct val="150000"/>
-              </a:lnSpc>
-              <a:buClr>
-                <a:schemeClr val="tx1"/>
-              </a:buClr>
-              <a:buFont typeface="Arial" panose="020B0604020202020204" pitchFamily="34" charset="0"/>
-              <a:buChar char="•"/>
-            </a:pPr>
-            <a:r>
-              <a:rPr lang="de-DE" sz="2000" dirty="0">
-                <a:solidFill>
-                  <a:schemeClr val="tx1"/>
-                </a:solidFill>
-              </a:rPr>
-              <a:t>Nicht mehr erweiterbar</a:t>
-            </a:r>
-          </a:p>
-          <a:p>
-            <a:pPr marL="457200" indent="-457200">
-              <a:lnSpc>
-                <a:spcPct val="150000"/>
-              </a:lnSpc>
-              <a:buClr>
-                <a:schemeClr val="tx1"/>
-              </a:buClr>
-              <a:buFont typeface="Arial" panose="020B0604020202020204" pitchFamily="34" charset="0"/>
-              <a:buChar char="•"/>
-            </a:pPr>
-            <a:r>
-              <a:rPr lang="de-DE" sz="2000" dirty="0">
-                <a:solidFill>
-                  <a:schemeClr val="tx1"/>
-                </a:solidFill>
-              </a:rPr>
-              <a:t>Starre Klassenhierarchien </a:t>
-            </a:r>
-          </a:p>
-          <a:p>
-            <a:pPr marL="457200" indent="-457200">
-              <a:lnSpc>
-                <a:spcPct val="150000"/>
-              </a:lnSpc>
-              <a:buClr>
-                <a:schemeClr val="tx1"/>
-              </a:buClr>
-              <a:buFont typeface="Arial" panose="020B0604020202020204" pitchFamily="34" charset="0"/>
-              <a:buChar char="•"/>
-            </a:pPr>
-            <a:r>
-              <a:rPr lang="de-DE" sz="2000" dirty="0">
-                <a:solidFill>
-                  <a:schemeClr val="tx1"/>
-                </a:solidFill>
-              </a:rPr>
-              <a:t>Keine Modularisierung </a:t>
-            </a:r>
-          </a:p>
-          <a:p>
-            <a:pPr marL="457200" indent="-457200">
-              <a:lnSpc>
-                <a:spcPct val="150000"/>
-              </a:lnSpc>
-              <a:buClr>
-                <a:schemeClr val="tx1"/>
-              </a:buClr>
-              <a:buFont typeface="Arial" panose="020B0604020202020204" pitchFamily="34" charset="0"/>
-              <a:buChar char="•"/>
-            </a:pPr>
-            <a:r>
-              <a:rPr lang="de-DE" sz="2000" i="1" dirty="0">
-                <a:solidFill>
-                  <a:schemeClr val="tx1"/>
-                </a:solidFill>
-              </a:rPr>
-              <a:t>E-Mails</a:t>
-            </a:r>
-            <a:r>
-              <a:rPr lang="de-DE" sz="2000" dirty="0">
-                <a:solidFill>
-                  <a:schemeClr val="tx1"/>
-                </a:solidFill>
-              </a:rPr>
-              <a:t> nicht rekonstruierbar</a:t>
-            </a:r>
-          </a:p>
-          <a:p>
-            <a:pPr marL="457200" indent="-457200">
-              <a:lnSpc>
-                <a:spcPct val="150000"/>
-              </a:lnSpc>
-              <a:buClr>
-                <a:schemeClr val="tx1"/>
-              </a:buClr>
-              <a:buFont typeface="Arial" panose="020B0604020202020204" pitchFamily="34" charset="0"/>
-              <a:buChar char="•"/>
-            </a:pPr>
-            <a:r>
-              <a:rPr lang="de-DE" sz="2000" dirty="0">
-                <a:solidFill>
-                  <a:schemeClr val="tx1"/>
-                </a:solidFill>
-              </a:rPr>
-              <a:t>Statisch definierte </a:t>
-            </a:r>
-            <a:r>
-              <a:rPr lang="de-DE" sz="2000" i="1" dirty="0">
-                <a:solidFill>
-                  <a:schemeClr val="tx1"/>
-                </a:solidFill>
-              </a:rPr>
-              <a:t>E-Mail</a:t>
-            </a:r>
-            <a:r>
-              <a:rPr lang="de-DE" sz="2000" dirty="0">
-                <a:solidFill>
-                  <a:schemeClr val="tx1"/>
-                </a:solidFill>
-              </a:rPr>
-              <a:t>-Vorlagen</a:t>
-            </a:r>
-          </a:p>
-          <a:p>
-            <a:pPr marL="457200" indent="-457200">
-              <a:lnSpc>
-                <a:spcPct val="150000"/>
-              </a:lnSpc>
-              <a:buClr>
-                <a:schemeClr val="tx1"/>
-              </a:buClr>
-              <a:buFont typeface="Arial" panose="020B0604020202020204" pitchFamily="34" charset="0"/>
-              <a:buChar char="•"/>
-            </a:pPr>
-            <a:r>
-              <a:rPr lang="de-DE" sz="2000" dirty="0">
-                <a:solidFill>
-                  <a:schemeClr val="tx1"/>
-                </a:solidFill>
-              </a:rPr>
-              <a:t>Zeitbedingte Dateninkonsistenz</a:t>
-            </a:r>
-          </a:p>
-          <a:p>
-            <a:pPr marL="457200" indent="-457200">
-              <a:lnSpc>
-                <a:spcPct val="150000"/>
-              </a:lnSpc>
-              <a:buClr>
-                <a:schemeClr val="tx1"/>
-              </a:buClr>
-              <a:buFont typeface="Arial" panose="020B0604020202020204" pitchFamily="34" charset="0"/>
-              <a:buChar char="•"/>
-            </a:pPr>
-            <a:r>
-              <a:rPr lang="de-DE" sz="2000" dirty="0">
-                <a:solidFill>
-                  <a:schemeClr val="tx1"/>
-                </a:solidFill>
-              </a:rPr>
-              <a:t>Nur eine Instanz von </a:t>
-            </a:r>
-            <a:r>
-              <a:rPr lang="de-DE" sz="2000" i="1" dirty="0" err="1">
-                <a:solidFill>
-                  <a:schemeClr val="tx1"/>
-                </a:solidFill>
-              </a:rPr>
-              <a:t>CCMail</a:t>
-            </a:r>
-            <a:r>
-              <a:rPr lang="de-DE" sz="2000" dirty="0">
-                <a:solidFill>
-                  <a:schemeClr val="tx1"/>
-                </a:solidFill>
-              </a:rPr>
-              <a:t> möglich</a:t>
-            </a:r>
-          </a:p>
-          <a:p>
-            <a:pPr marL="342900" indent="-342900">
-              <a:lnSpc>
-                <a:spcPct val="150000"/>
-              </a:lnSpc>
-              <a:buClrTx/>
-              <a:buFont typeface="Arial" panose="020B0604020202020204" pitchFamily="34" charset="0"/>
-              <a:buChar char="•"/>
-            </a:pPr>
-            <a:endParaRPr lang="de-DE" sz="1500" dirty="0">
-              <a:solidFill>
-                <a:schemeClr val="tx1"/>
-              </a:solidFill>
-            </a:endParaRPr>
-          </a:p>
-          <a:p>
-            <a:pPr marL="342900" indent="-342900">
-              <a:lnSpc>
-                <a:spcPct val="150000"/>
-              </a:lnSpc>
-              <a:buClrTx/>
-              <a:buFont typeface="Arial" panose="020B0604020202020204" pitchFamily="34" charset="0"/>
-              <a:buChar char="•"/>
-            </a:pPr>
-            <a:endParaRPr lang="de-DE" sz="1500" dirty="0">
-              <a:solidFill>
-                <a:schemeClr val="tx1"/>
-              </a:solidFill>
-            </a:endParaRPr>
-          </a:p>
-          <a:p>
-            <a:pPr marL="342900" indent="-342900">
-              <a:buClrTx/>
-              <a:buFont typeface="Arial" panose="020B0604020202020204" pitchFamily="34" charset="0"/>
-              <a:buChar char="•"/>
-            </a:pPr>
-            <a:endParaRPr lang="de-DE" sz="1500" dirty="0">
-              <a:solidFill>
-                <a:schemeClr val="tx1"/>
-              </a:solidFill>
-            </a:endParaRPr>
-          </a:p>
-          <a:p>
-            <a:pPr marL="342900" indent="-342900">
-              <a:lnSpc>
-                <a:spcPct val="200000"/>
-              </a:lnSpc>
-              <a:buClrTx/>
-              <a:buFont typeface="Arial" panose="020B0604020202020204" pitchFamily="34" charset="0"/>
-              <a:buChar char="•"/>
-            </a:pPr>
-            <a:endParaRPr lang="de-DE" sz="1500" dirty="0">
-              <a:solidFill>
-                <a:schemeClr val="tx1"/>
-              </a:solidFill>
-            </a:endParaRPr>
-          </a:p>
-        </p:txBody>
-      </p:sp>
     </p:spTree>
     <p:extLst>
       <p:ext uri="{BB962C8B-B14F-4D97-AF65-F5344CB8AC3E}">
@@ -9440,11 +9513,7 @@
             <a:pPr algn="ctr"/>
             <a:r>
               <a:rPr lang="de-DE" dirty="0"/>
-              <a:t>Systemaufbau </a:t>
-            </a:r>
-            <a:r>
-              <a:rPr lang="de-DE" i="1" dirty="0" err="1"/>
-              <a:t>CleverMail</a:t>
+              <a:t>Zielsetzung</a:t>
             </a:r>
             <a:endParaRPr lang="de-DE" i="1" dirty="0"/>
           </a:p>
@@ -9469,6 +9538,828 @@
               <a:rPr lang="en-US" b="1" smtClean="0"/>
               <a:pPr/>
               <a:t>3</a:t>
+            </a:fld>
+            <a:endParaRPr lang="en-US" b="1" dirty="0"/>
+          </a:p>
+        </p:txBody>
+      </p:sp>
+      <p:sp>
+        <p:nvSpPr>
+          <p:cNvPr id="10" name="Textplatzhalter 2"/>
+          <p:cNvSpPr>
+            <a:spLocks noGrp="1"/>
+          </p:cNvSpPr>
+          <p:nvPr>
+            <p:ph type="body" idx="1"/>
+          </p:nvPr>
+        </p:nvSpPr>
+        <p:spPr>
+          <a:xfrm>
+            <a:off x="1676400" y="990600"/>
+            <a:ext cx="10515600" cy="5867400"/>
+          </a:xfrm>
+        </p:spPr>
+        <p:txBody>
+          <a:bodyPr anchor="t">
+            <a:normAutofit/>
+          </a:bodyPr>
+          <a:lstStyle/>
+          <a:p>
+            <a:pPr marL="457200" indent="-457200">
+              <a:lnSpc>
+                <a:spcPct val="150000"/>
+              </a:lnSpc>
+              <a:buClr>
+                <a:schemeClr val="tx1"/>
+              </a:buClr>
+              <a:buFont typeface="Arial" panose="020B0604020202020204" pitchFamily="34" charset="0"/>
+              <a:buChar char="•"/>
+            </a:pPr>
+            <a:r>
+              <a:rPr lang="de-DE" sz="2000" dirty="0">
+                <a:solidFill>
+                  <a:schemeClr val="tx1"/>
+                </a:solidFill>
+              </a:rPr>
+              <a:t>Vorbereitung für die praktische Bachelorarbeit </a:t>
+            </a:r>
+            <a:r>
+              <a:rPr lang="de-DE" sz="1700" dirty="0">
+                <a:solidFill>
+                  <a:schemeClr val="tx1"/>
+                </a:solidFill>
+              </a:rPr>
+              <a:t>(Vorlagenmanagement für </a:t>
+            </a:r>
+            <a:r>
+              <a:rPr lang="de-DE" sz="1700" i="1" dirty="0" err="1">
+                <a:solidFill>
+                  <a:schemeClr val="tx1"/>
+                </a:solidFill>
+              </a:rPr>
+              <a:t>CleverMail</a:t>
+            </a:r>
+            <a:r>
+              <a:rPr lang="de-DE" sz="1700" dirty="0">
+                <a:solidFill>
+                  <a:schemeClr val="tx1"/>
+                </a:solidFill>
+              </a:rPr>
+              <a:t>)</a:t>
+            </a:r>
+          </a:p>
+          <a:p>
+            <a:pPr marL="457200" indent="-457200">
+              <a:lnSpc>
+                <a:spcPct val="150000"/>
+              </a:lnSpc>
+              <a:buClr>
+                <a:schemeClr val="tx1"/>
+              </a:buClr>
+              <a:buFont typeface="Arial" panose="020B0604020202020204" pitchFamily="34" charset="0"/>
+              <a:buChar char="•"/>
+            </a:pPr>
+            <a:r>
+              <a:rPr lang="de-DE" sz="2000" dirty="0">
+                <a:solidFill>
+                  <a:schemeClr val="tx1"/>
+                </a:solidFill>
+              </a:rPr>
+              <a:t>Designanalyse der bestehenden </a:t>
+            </a:r>
+            <a:r>
+              <a:rPr lang="de-DE" sz="2000" i="1" dirty="0">
+                <a:solidFill>
+                  <a:schemeClr val="tx1"/>
+                </a:solidFill>
+              </a:rPr>
+              <a:t>Mail-Service</a:t>
+            </a:r>
+            <a:r>
+              <a:rPr lang="de-DE" sz="2000" dirty="0">
+                <a:solidFill>
+                  <a:schemeClr val="tx1"/>
+                </a:solidFill>
+              </a:rPr>
+              <a:t> </a:t>
+            </a:r>
+            <a:r>
+              <a:rPr lang="de-DE" sz="2000" i="1" dirty="0" err="1">
+                <a:solidFill>
+                  <a:schemeClr val="tx1"/>
+                </a:solidFill>
+              </a:rPr>
+              <a:t>CCMail</a:t>
+            </a:r>
+            <a:endParaRPr lang="de-DE" sz="2000" i="1" dirty="0">
+              <a:solidFill>
+                <a:schemeClr val="tx1"/>
+              </a:solidFill>
+            </a:endParaRPr>
+          </a:p>
+          <a:p>
+            <a:pPr marL="914400" lvl="1" indent="-457200">
+              <a:lnSpc>
+                <a:spcPct val="150000"/>
+              </a:lnSpc>
+              <a:buClr>
+                <a:schemeClr val="tx1"/>
+              </a:buClr>
+              <a:buFont typeface="Arial" panose="020B0604020202020204" pitchFamily="34" charset="0"/>
+              <a:buChar char="•"/>
+            </a:pPr>
+            <a:r>
+              <a:rPr lang="de-DE" sz="2000" dirty="0">
+                <a:solidFill>
+                  <a:schemeClr val="tx1"/>
+                </a:solidFill>
+              </a:rPr>
+              <a:t>Architektur</a:t>
+            </a:r>
+          </a:p>
+          <a:p>
+            <a:pPr marL="914400" lvl="1" indent="-457200">
+              <a:lnSpc>
+                <a:spcPct val="150000"/>
+              </a:lnSpc>
+              <a:buClr>
+                <a:schemeClr val="tx1"/>
+              </a:buClr>
+              <a:buFont typeface="Arial" panose="020B0604020202020204" pitchFamily="34" charset="0"/>
+              <a:buChar char="•"/>
+            </a:pPr>
+            <a:r>
+              <a:rPr lang="de-DE" sz="2000" dirty="0">
+                <a:solidFill>
+                  <a:schemeClr val="tx1"/>
+                </a:solidFill>
+              </a:rPr>
+              <a:t>Softwaredesign</a:t>
+            </a:r>
+          </a:p>
+          <a:p>
+            <a:pPr marL="457200" indent="-457200">
+              <a:lnSpc>
+                <a:spcPct val="150000"/>
+              </a:lnSpc>
+              <a:buClr>
+                <a:schemeClr val="tx1"/>
+              </a:buClr>
+              <a:buFont typeface="Arial" panose="020B0604020202020204" pitchFamily="34" charset="0"/>
+              <a:buChar char="•"/>
+            </a:pPr>
+            <a:r>
+              <a:rPr lang="de-DE" sz="2000" dirty="0">
+                <a:solidFill>
+                  <a:schemeClr val="tx1"/>
+                </a:solidFill>
+              </a:rPr>
+              <a:t>Konzept der neuen </a:t>
+            </a:r>
+            <a:r>
+              <a:rPr lang="de-DE" sz="2000" i="1" dirty="0">
+                <a:solidFill>
+                  <a:schemeClr val="tx1"/>
+                </a:solidFill>
+              </a:rPr>
+              <a:t>Mail-Service</a:t>
+            </a:r>
+            <a:r>
+              <a:rPr lang="de-DE" sz="2000" dirty="0">
+                <a:solidFill>
+                  <a:schemeClr val="tx1"/>
+                </a:solidFill>
+              </a:rPr>
+              <a:t> </a:t>
+            </a:r>
+            <a:r>
+              <a:rPr lang="de-DE" sz="2000" i="1" dirty="0" err="1">
+                <a:solidFill>
+                  <a:schemeClr val="tx1"/>
+                </a:solidFill>
+              </a:rPr>
+              <a:t>CleverMail</a:t>
+            </a:r>
+            <a:endParaRPr lang="de-DE" sz="2000" i="1" dirty="0">
+              <a:solidFill>
+                <a:schemeClr val="tx1"/>
+              </a:solidFill>
+            </a:endParaRPr>
+          </a:p>
+          <a:p>
+            <a:pPr marL="457200" indent="-457200">
+              <a:lnSpc>
+                <a:spcPct val="150000"/>
+              </a:lnSpc>
+              <a:buClr>
+                <a:schemeClr val="tx1"/>
+              </a:buClr>
+              <a:buFont typeface="Arial" panose="020B0604020202020204" pitchFamily="34" charset="0"/>
+              <a:buChar char="•"/>
+            </a:pPr>
+            <a:r>
+              <a:rPr lang="de-DE" sz="2000" dirty="0">
+                <a:solidFill>
+                  <a:schemeClr val="tx1"/>
+                </a:solidFill>
+              </a:rPr>
+              <a:t>Erfüllen der neuen Anforderungen</a:t>
+            </a:r>
+          </a:p>
+          <a:p>
+            <a:pPr marL="914400" lvl="1" indent="-457200">
+              <a:lnSpc>
+                <a:spcPct val="150000"/>
+              </a:lnSpc>
+              <a:buClr>
+                <a:schemeClr val="tx1"/>
+              </a:buClr>
+              <a:buFont typeface="Arial" panose="020B0604020202020204" pitchFamily="34" charset="0"/>
+              <a:buChar char="•"/>
+            </a:pPr>
+            <a:r>
+              <a:rPr lang="de-DE" sz="2000" dirty="0">
+                <a:solidFill>
+                  <a:schemeClr val="tx1"/>
+                </a:solidFill>
+              </a:rPr>
+              <a:t>Dynamische Vorlagen</a:t>
+            </a:r>
+          </a:p>
+          <a:p>
+            <a:pPr marL="914400" lvl="1" indent="-457200">
+              <a:lnSpc>
+                <a:spcPct val="150000"/>
+              </a:lnSpc>
+              <a:buClr>
+                <a:schemeClr val="tx1"/>
+              </a:buClr>
+              <a:buFont typeface="Arial" panose="020B0604020202020204" pitchFamily="34" charset="0"/>
+              <a:buChar char="•"/>
+            </a:pPr>
+            <a:r>
+              <a:rPr lang="de-DE" sz="2000" dirty="0">
+                <a:solidFill>
+                  <a:schemeClr val="tx1"/>
+                </a:solidFill>
+              </a:rPr>
+              <a:t>Mehr Benutzerkontrolle</a:t>
+            </a:r>
+          </a:p>
+          <a:p>
+            <a:pPr marL="457200" indent="-457200">
+              <a:lnSpc>
+                <a:spcPct val="150000"/>
+              </a:lnSpc>
+              <a:buClr>
+                <a:schemeClr val="tx1"/>
+              </a:buClr>
+              <a:buFont typeface="Arial" panose="020B0604020202020204" pitchFamily="34" charset="0"/>
+              <a:buChar char="•"/>
+            </a:pPr>
+            <a:r>
+              <a:rPr lang="de-DE" sz="2000" i="1" dirty="0" err="1">
+                <a:solidFill>
+                  <a:schemeClr val="tx1"/>
+                </a:solidFill>
+              </a:rPr>
+              <a:t>CCMail</a:t>
+            </a:r>
+            <a:r>
+              <a:rPr lang="de-DE" sz="2000" dirty="0">
+                <a:solidFill>
+                  <a:schemeClr val="tx1"/>
+                </a:solidFill>
+              </a:rPr>
+              <a:t> nicht mehr erweiterbar (Java 1.4)</a:t>
+            </a:r>
+          </a:p>
+          <a:p>
+            <a:pPr marL="342900" indent="-342900">
+              <a:buClrTx/>
+              <a:buFont typeface="Arial" panose="020B0604020202020204" pitchFamily="34" charset="0"/>
+              <a:buChar char="•"/>
+            </a:pPr>
+            <a:endParaRPr lang="de-DE" sz="1500" dirty="0">
+              <a:solidFill>
+                <a:schemeClr val="tx1"/>
+              </a:solidFill>
+            </a:endParaRPr>
+          </a:p>
+          <a:p>
+            <a:pPr marL="342900" indent="-342900">
+              <a:lnSpc>
+                <a:spcPct val="200000"/>
+              </a:lnSpc>
+              <a:buClrTx/>
+              <a:buFont typeface="Arial" panose="020B0604020202020204" pitchFamily="34" charset="0"/>
+              <a:buChar char="•"/>
+            </a:pPr>
+            <a:endParaRPr lang="de-DE" sz="1500" dirty="0">
+              <a:solidFill>
+                <a:schemeClr val="tx1"/>
+              </a:solidFill>
+            </a:endParaRPr>
+          </a:p>
+        </p:txBody>
+      </p:sp>
+    </p:spTree>
+    <p:extLst>
+      <p:ext uri="{BB962C8B-B14F-4D97-AF65-F5344CB8AC3E}">
+        <p14:creationId xmlns:p14="http://schemas.microsoft.com/office/powerpoint/2010/main" val="3482660794"/>
+      </p:ext>
+    </p:extLst>
+  </p:cSld>
+  <p:clrMapOvr>
+    <a:masterClrMapping/>
+  </p:clrMapOvr>
+</p:sld>
+</file>
+
+<file path=ppt/slides/slide4.xml><?xml version="1.0" encoding="utf-8"?>
+<p:sld xmlns:a="http://schemas.openxmlformats.org/drawingml/2006/main" xmlns:r="http://schemas.openxmlformats.org/officeDocument/2006/relationships" xmlns:p="http://schemas.openxmlformats.org/presentationml/2006/main">
+  <p:cSld>
+    <p:spTree>
+      <p:nvGrpSpPr>
+        <p:cNvPr id="1" name=""/>
+        <p:cNvGrpSpPr/>
+        <p:nvPr/>
+      </p:nvGrpSpPr>
+      <p:grpSpPr>
+        <a:xfrm>
+          <a:off x="0" y="0"/>
+          <a:ext cx="0" cy="0"/>
+          <a:chOff x="0" y="0"/>
+          <a:chExt cx="0" cy="0"/>
+        </a:xfrm>
+      </p:grpSpPr>
+      <p:sp>
+        <p:nvSpPr>
+          <p:cNvPr id="2" name="Titel 1"/>
+          <p:cNvSpPr>
+            <a:spLocks noGrp="1"/>
+          </p:cNvSpPr>
+          <p:nvPr>
+            <p:ph type="title"/>
+          </p:nvPr>
+        </p:nvSpPr>
+        <p:spPr>
+          <a:xfrm>
+            <a:off x="0" y="-8706"/>
+            <a:ext cx="12192000" cy="1005840"/>
+          </a:xfrm>
+        </p:spPr>
+        <p:txBody>
+          <a:bodyPr>
+            <a:normAutofit/>
+          </a:bodyPr>
+          <a:lstStyle/>
+          <a:p>
+            <a:pPr algn="ctr"/>
+            <a:r>
+              <a:rPr lang="de-DE" dirty="0"/>
+              <a:t>Systemaufbau </a:t>
+            </a:r>
+            <a:r>
+              <a:rPr lang="de-DE" i="1" dirty="0" err="1"/>
+              <a:t>CCMail</a:t>
+            </a:r>
+            <a:endParaRPr lang="de-DE" i="1" dirty="0"/>
+          </a:p>
+        </p:txBody>
+      </p:sp>
+      <p:sp>
+        <p:nvSpPr>
+          <p:cNvPr id="7" name="Foliennummernplatzhalter 6"/>
+          <p:cNvSpPr>
+            <a:spLocks noGrp="1"/>
+          </p:cNvSpPr>
+          <p:nvPr>
+            <p:ph type="sldNum" sz="quarter" idx="12"/>
+          </p:nvPr>
+        </p:nvSpPr>
+        <p:spPr/>
+        <p:txBody>
+          <a:bodyPr/>
+          <a:lstStyle/>
+          <a:p>
+            <a:fld id="{D57F1E4F-1CFF-5643-939E-217C01CDF565}" type="slidenum">
+              <a:rPr lang="en-US" b="1" smtClean="0"/>
+              <a:pPr/>
+              <a:t>4</a:t>
+            </a:fld>
+            <a:endParaRPr lang="en-US" b="1" dirty="0"/>
+          </a:p>
+        </p:txBody>
+      </p:sp>
+      <p:pic>
+        <p:nvPicPr>
+          <p:cNvPr id="9" name="Grafik 8"/>
+          <p:cNvPicPr>
+            <a:picLocks noChangeAspect="1"/>
+          </p:cNvPicPr>
+          <p:nvPr/>
+        </p:nvPicPr>
+        <p:blipFill>
+          <a:blip r:embed="rId2"/>
+          <a:stretch>
+            <a:fillRect/>
+          </a:stretch>
+        </p:blipFill>
+        <p:spPr>
+          <a:xfrm>
+            <a:off x="1676400" y="1315324"/>
+            <a:ext cx="4687720" cy="4227352"/>
+          </a:xfrm>
+          <a:prstGeom prst="rect">
+            <a:avLst/>
+          </a:prstGeom>
+        </p:spPr>
+      </p:pic>
+      <p:sp>
+        <p:nvSpPr>
+          <p:cNvPr id="10" name="Textplatzhalter 2"/>
+          <p:cNvSpPr>
+            <a:spLocks noGrp="1"/>
+          </p:cNvSpPr>
+          <p:nvPr>
+            <p:ph type="body" idx="1"/>
+          </p:nvPr>
+        </p:nvSpPr>
+        <p:spPr>
+          <a:xfrm>
+            <a:off x="6484690" y="990600"/>
+            <a:ext cx="5707310" cy="5777158"/>
+          </a:xfrm>
+        </p:spPr>
+        <p:txBody>
+          <a:bodyPr anchor="t">
+            <a:normAutofit/>
+          </a:bodyPr>
+          <a:lstStyle/>
+          <a:p>
+            <a:pPr marL="457200" indent="-457200">
+              <a:lnSpc>
+                <a:spcPct val="150000"/>
+              </a:lnSpc>
+              <a:buClr>
+                <a:schemeClr val="tx1"/>
+              </a:buClr>
+              <a:buFont typeface="Arial" panose="020B0604020202020204" pitchFamily="34" charset="0"/>
+              <a:buChar char="•"/>
+            </a:pPr>
+            <a:r>
+              <a:rPr lang="de-DE" sz="2000" dirty="0">
+                <a:solidFill>
+                  <a:schemeClr val="tx1"/>
+                </a:solidFill>
+              </a:rPr>
+              <a:t>Mit Java 1.4 implementiert</a:t>
+            </a:r>
+          </a:p>
+          <a:p>
+            <a:pPr marL="457200" indent="-457200">
+              <a:lnSpc>
+                <a:spcPct val="150000"/>
+              </a:lnSpc>
+              <a:buClr>
+                <a:schemeClr val="tx1"/>
+              </a:buClr>
+              <a:buFont typeface="Arial" panose="020B0604020202020204" pitchFamily="34" charset="0"/>
+              <a:buChar char="•"/>
+            </a:pPr>
+            <a:r>
+              <a:rPr lang="de-DE" sz="2000" dirty="0">
+                <a:solidFill>
+                  <a:schemeClr val="tx1"/>
+                </a:solidFill>
+              </a:rPr>
+              <a:t>Stätig gewachsen aber nie reorganisiert</a:t>
+            </a:r>
+          </a:p>
+          <a:p>
+            <a:pPr marL="457200" indent="-457200">
+              <a:lnSpc>
+                <a:spcPct val="150000"/>
+              </a:lnSpc>
+              <a:buClr>
+                <a:schemeClr val="tx1"/>
+              </a:buClr>
+              <a:buFont typeface="Arial" panose="020B0604020202020204" pitchFamily="34" charset="0"/>
+              <a:buChar char="•"/>
+            </a:pPr>
+            <a:r>
+              <a:rPr lang="de-DE" sz="2000" dirty="0">
+                <a:solidFill>
+                  <a:schemeClr val="tx1"/>
+                </a:solidFill>
+              </a:rPr>
+              <a:t>Nicht mehr erweiterbar</a:t>
+            </a:r>
+          </a:p>
+          <a:p>
+            <a:pPr marL="457200" indent="-457200">
+              <a:lnSpc>
+                <a:spcPct val="150000"/>
+              </a:lnSpc>
+              <a:buClr>
+                <a:schemeClr val="tx1"/>
+              </a:buClr>
+              <a:buFont typeface="Arial" panose="020B0604020202020204" pitchFamily="34" charset="0"/>
+              <a:buChar char="•"/>
+            </a:pPr>
+            <a:r>
+              <a:rPr lang="de-DE" sz="2000" dirty="0">
+                <a:solidFill>
+                  <a:schemeClr val="tx1"/>
+                </a:solidFill>
+              </a:rPr>
+              <a:t>Starre Klassenhierarchien </a:t>
+            </a:r>
+          </a:p>
+          <a:p>
+            <a:pPr marL="457200" indent="-457200">
+              <a:lnSpc>
+                <a:spcPct val="150000"/>
+              </a:lnSpc>
+              <a:buClr>
+                <a:schemeClr val="tx1"/>
+              </a:buClr>
+              <a:buFont typeface="Arial" panose="020B0604020202020204" pitchFamily="34" charset="0"/>
+              <a:buChar char="•"/>
+            </a:pPr>
+            <a:r>
+              <a:rPr lang="de-DE" sz="2000" dirty="0">
+                <a:solidFill>
+                  <a:schemeClr val="tx1"/>
+                </a:solidFill>
+              </a:rPr>
+              <a:t>Keine Modularisierung </a:t>
+            </a:r>
+          </a:p>
+          <a:p>
+            <a:pPr marL="457200" indent="-457200">
+              <a:lnSpc>
+                <a:spcPct val="150000"/>
+              </a:lnSpc>
+              <a:buClr>
+                <a:schemeClr val="tx1"/>
+              </a:buClr>
+              <a:buFont typeface="Arial" panose="020B0604020202020204" pitchFamily="34" charset="0"/>
+              <a:buChar char="•"/>
+            </a:pPr>
+            <a:r>
+              <a:rPr lang="de-DE" sz="2000" i="1" dirty="0">
+                <a:solidFill>
+                  <a:schemeClr val="tx1"/>
+                </a:solidFill>
+              </a:rPr>
+              <a:t>E-Mails</a:t>
+            </a:r>
+            <a:r>
+              <a:rPr lang="de-DE" sz="2000" dirty="0">
+                <a:solidFill>
+                  <a:schemeClr val="tx1"/>
+                </a:solidFill>
+              </a:rPr>
+              <a:t> nicht rekonstruierbar</a:t>
+            </a:r>
+          </a:p>
+          <a:p>
+            <a:pPr marL="457200" indent="-457200">
+              <a:lnSpc>
+                <a:spcPct val="150000"/>
+              </a:lnSpc>
+              <a:buClr>
+                <a:schemeClr val="tx1"/>
+              </a:buClr>
+              <a:buFont typeface="Arial" panose="020B0604020202020204" pitchFamily="34" charset="0"/>
+              <a:buChar char="•"/>
+            </a:pPr>
+            <a:r>
+              <a:rPr lang="de-DE" sz="2000" dirty="0">
+                <a:solidFill>
+                  <a:schemeClr val="tx1"/>
+                </a:solidFill>
+              </a:rPr>
+              <a:t>Statisch definierte </a:t>
+            </a:r>
+            <a:r>
+              <a:rPr lang="de-DE" sz="2000" i="1" dirty="0">
+                <a:solidFill>
+                  <a:schemeClr val="tx1"/>
+                </a:solidFill>
+              </a:rPr>
+              <a:t>E-Mail</a:t>
+            </a:r>
+            <a:r>
+              <a:rPr lang="de-DE" sz="2000" dirty="0">
+                <a:solidFill>
+                  <a:schemeClr val="tx1"/>
+                </a:solidFill>
+              </a:rPr>
+              <a:t>-Vorlagen</a:t>
+            </a:r>
+          </a:p>
+          <a:p>
+            <a:pPr marL="457200" indent="-457200">
+              <a:lnSpc>
+                <a:spcPct val="150000"/>
+              </a:lnSpc>
+              <a:buClr>
+                <a:schemeClr val="tx1"/>
+              </a:buClr>
+              <a:buFont typeface="Arial" panose="020B0604020202020204" pitchFamily="34" charset="0"/>
+              <a:buChar char="•"/>
+            </a:pPr>
+            <a:r>
+              <a:rPr lang="de-DE" sz="2000" dirty="0">
+                <a:solidFill>
+                  <a:schemeClr val="tx1"/>
+                </a:solidFill>
+              </a:rPr>
+              <a:t>Zeitbedingte Dateninkonsistenz</a:t>
+            </a:r>
+          </a:p>
+          <a:p>
+            <a:pPr marL="457200" indent="-457200">
+              <a:lnSpc>
+                <a:spcPct val="150000"/>
+              </a:lnSpc>
+              <a:buClr>
+                <a:schemeClr val="tx1"/>
+              </a:buClr>
+              <a:buFont typeface="Arial" panose="020B0604020202020204" pitchFamily="34" charset="0"/>
+              <a:buChar char="•"/>
+            </a:pPr>
+            <a:r>
+              <a:rPr lang="de-DE" sz="2000" dirty="0">
+                <a:solidFill>
+                  <a:schemeClr val="tx1"/>
+                </a:solidFill>
+              </a:rPr>
+              <a:t>Nur eine Instanz von </a:t>
+            </a:r>
+            <a:r>
+              <a:rPr lang="de-DE" sz="2000" i="1" dirty="0" err="1">
+                <a:solidFill>
+                  <a:schemeClr val="tx1"/>
+                </a:solidFill>
+              </a:rPr>
+              <a:t>CCMail</a:t>
+            </a:r>
+            <a:r>
+              <a:rPr lang="de-DE" sz="2000" dirty="0">
+                <a:solidFill>
+                  <a:schemeClr val="tx1"/>
+                </a:solidFill>
+              </a:rPr>
+              <a:t> möglich</a:t>
+            </a:r>
+          </a:p>
+          <a:p>
+            <a:pPr marL="342900" indent="-342900">
+              <a:lnSpc>
+                <a:spcPct val="150000"/>
+              </a:lnSpc>
+              <a:buClrTx/>
+              <a:buFont typeface="Arial" panose="020B0604020202020204" pitchFamily="34" charset="0"/>
+              <a:buChar char="•"/>
+            </a:pPr>
+            <a:endParaRPr lang="de-DE" sz="1500" dirty="0">
+              <a:solidFill>
+                <a:schemeClr val="tx1"/>
+              </a:solidFill>
+            </a:endParaRPr>
+          </a:p>
+          <a:p>
+            <a:pPr marL="342900" indent="-342900">
+              <a:lnSpc>
+                <a:spcPct val="150000"/>
+              </a:lnSpc>
+              <a:buClrTx/>
+              <a:buFont typeface="Arial" panose="020B0604020202020204" pitchFamily="34" charset="0"/>
+              <a:buChar char="•"/>
+            </a:pPr>
+            <a:endParaRPr lang="de-DE" sz="1500" dirty="0">
+              <a:solidFill>
+                <a:schemeClr val="tx1"/>
+              </a:solidFill>
+            </a:endParaRPr>
+          </a:p>
+          <a:p>
+            <a:pPr marL="342900" indent="-342900">
+              <a:buClrTx/>
+              <a:buFont typeface="Arial" panose="020B0604020202020204" pitchFamily="34" charset="0"/>
+              <a:buChar char="•"/>
+            </a:pPr>
+            <a:endParaRPr lang="de-DE" sz="1500" dirty="0">
+              <a:solidFill>
+                <a:schemeClr val="tx1"/>
+              </a:solidFill>
+            </a:endParaRPr>
+          </a:p>
+          <a:p>
+            <a:pPr marL="342900" indent="-342900">
+              <a:lnSpc>
+                <a:spcPct val="200000"/>
+              </a:lnSpc>
+              <a:buClrTx/>
+              <a:buFont typeface="Arial" panose="020B0604020202020204" pitchFamily="34" charset="0"/>
+              <a:buChar char="•"/>
+            </a:pPr>
+            <a:endParaRPr lang="de-DE" sz="1500" dirty="0">
+              <a:solidFill>
+                <a:schemeClr val="tx1"/>
+              </a:solidFill>
+            </a:endParaRPr>
+          </a:p>
+        </p:txBody>
+      </p:sp>
+    </p:spTree>
+    <p:extLst>
+      <p:ext uri="{BB962C8B-B14F-4D97-AF65-F5344CB8AC3E}">
+        <p14:creationId xmlns:p14="http://schemas.microsoft.com/office/powerpoint/2010/main" val="877004394"/>
+      </p:ext>
+    </p:extLst>
+  </p:cSld>
+  <p:clrMapOvr>
+    <a:masterClrMapping/>
+  </p:clrMapOvr>
+</p:sld>
+</file>
+
+<file path=ppt/slides/slide5.xml><?xml version="1.0" encoding="utf-8"?>
+<p:sld xmlns:a="http://schemas.openxmlformats.org/drawingml/2006/main" xmlns:r="http://schemas.openxmlformats.org/officeDocument/2006/relationships" xmlns:p="http://schemas.openxmlformats.org/presentationml/2006/main">
+  <p:cSld>
+    <p:spTree>
+      <p:nvGrpSpPr>
+        <p:cNvPr id="1" name=""/>
+        <p:cNvGrpSpPr/>
+        <p:nvPr/>
+      </p:nvGrpSpPr>
+      <p:grpSpPr>
+        <a:xfrm>
+          <a:off x="0" y="0"/>
+          <a:ext cx="0" cy="0"/>
+          <a:chOff x="0" y="0"/>
+          <a:chExt cx="0" cy="0"/>
+        </a:xfrm>
+      </p:grpSpPr>
+      <p:sp>
+        <p:nvSpPr>
+          <p:cNvPr id="2" name="Titel 1"/>
+          <p:cNvSpPr>
+            <a:spLocks noGrp="1"/>
+          </p:cNvSpPr>
+          <p:nvPr>
+            <p:ph type="title"/>
+          </p:nvPr>
+        </p:nvSpPr>
+        <p:spPr>
+          <a:xfrm>
+            <a:off x="0" y="-8706"/>
+            <a:ext cx="12192000" cy="1005840"/>
+          </a:xfrm>
+        </p:spPr>
+        <p:txBody>
+          <a:bodyPr>
+            <a:normAutofit/>
+          </a:bodyPr>
+          <a:lstStyle/>
+          <a:p>
+            <a:pPr algn="ctr"/>
+            <a:r>
+              <a:rPr lang="de-DE" dirty="0"/>
+              <a:t>Systemaufbau </a:t>
+            </a:r>
+            <a:r>
+              <a:rPr lang="de-DE" i="1" dirty="0" err="1"/>
+              <a:t>CleverMail</a:t>
+            </a:r>
+            <a:endParaRPr lang="de-DE" i="1" dirty="0"/>
+          </a:p>
+        </p:txBody>
+      </p:sp>
+      <p:sp>
+        <p:nvSpPr>
+          <p:cNvPr id="7" name="Foliennummernplatzhalter 6"/>
+          <p:cNvSpPr>
+            <a:spLocks noGrp="1"/>
+          </p:cNvSpPr>
+          <p:nvPr>
+            <p:ph type="sldNum" sz="quarter" idx="12"/>
+          </p:nvPr>
+        </p:nvSpPr>
+        <p:spPr/>
+        <p:txBody>
+          <a:bodyPr/>
+          <a:lstStyle/>
+          <a:p>
+            <a:fld id="{D57F1E4F-1CFF-5643-939E-217C01CDF565}" type="slidenum">
+              <a:rPr lang="en-US" b="1" smtClean="0"/>
+              <a:pPr/>
+              <a:t>5</a:t>
             </a:fld>
             <a:endParaRPr lang="en-US" b="1" dirty="0"/>
           </a:p>
@@ -9511,7 +10402,7 @@
 </p:sld>
 </file>
 
-<file path=ppt/slides/slide4.xml><?xml version="1.0" encoding="utf-8"?>
+<file path=ppt/slides/slide6.xml><?xml version="1.0" encoding="utf-8"?>
 <p:sld xmlns:a="http://schemas.openxmlformats.org/drawingml/2006/main" xmlns:r="http://schemas.openxmlformats.org/officeDocument/2006/relationships" xmlns:p="http://schemas.openxmlformats.org/presentationml/2006/main">
   <p:cSld>
     <p:spTree>
@@ -9598,7 +10489,7 @@
             <a:fld id="{D57F1E4F-1CFF-5643-939E-217C01CDF565}" type="slidenum">
               <a:rPr lang="en-US" b="1" smtClean="0"/>
               <a:pPr/>
-              <a:t>4</a:t>
+              <a:t>6</a:t>
             </a:fld>
             <a:endParaRPr lang="en-US" b="1" dirty="0"/>
           </a:p>
@@ -9641,7 +10532,7 @@
 </p:sld>
 </file>
 
-<file path=ppt/slides/slide5.xml><?xml version="1.0" encoding="utf-8"?>
+<file path=ppt/slides/slide7.xml><?xml version="1.0" encoding="utf-8"?>
 <p:sld xmlns:a="http://schemas.openxmlformats.org/drawingml/2006/main" xmlns:r="http://schemas.openxmlformats.org/officeDocument/2006/relationships" xmlns:p="http://schemas.openxmlformats.org/presentationml/2006/main">
   <p:cSld>
     <p:spTree>
@@ -9728,7 +10619,7 @@
             <a:fld id="{D57F1E4F-1CFF-5643-939E-217C01CDF565}" type="slidenum">
               <a:rPr lang="en-US" b="1" smtClean="0"/>
               <a:pPr/>
-              <a:t>5</a:t>
+              <a:t>7</a:t>
             </a:fld>
             <a:endParaRPr lang="en-US" b="1" dirty="0"/>
           </a:p>
@@ -10312,12 +11203,20 @@
               <a:buChar char="•"/>
             </a:pPr>
             <a:r>
+              <a:rPr lang="de-DE" sz="2000" i="1" dirty="0">
+                <a:solidFill>
+                  <a:schemeClr val="tx1"/>
+                </a:solidFill>
+              </a:rPr>
+              <a:t>Queue</a:t>
+            </a:r>
+            <a:r>
               <a:rPr lang="de-DE" sz="2000" dirty="0">
                 <a:solidFill>
                   <a:schemeClr val="tx1"/>
                 </a:solidFill>
               </a:rPr>
-              <a:t>Queue notwendig</a:t>
+              <a:t> notwendig</a:t>
             </a:r>
           </a:p>
           <a:p>
@@ -10426,7 +11325,7 @@
 </p:sld>
 </file>
 
-<file path=ppt/slides/slide6.xml><?xml version="1.0" encoding="utf-8"?>
+<file path=ppt/slides/slide8.xml><?xml version="1.0" encoding="utf-8"?>
 <p:sld xmlns:a="http://schemas.openxmlformats.org/drawingml/2006/main" xmlns:r="http://schemas.openxmlformats.org/officeDocument/2006/relationships" xmlns:p="http://schemas.openxmlformats.org/presentationml/2006/main">
   <p:cSld>
     <p:spTree>
@@ -10499,7 +11398,7 @@
             <a:fld id="{D57F1E4F-1CFF-5643-939E-217C01CDF565}" type="slidenum">
               <a:rPr lang="en-US" b="1" smtClean="0"/>
               <a:pPr/>
-              <a:t>6</a:t>
+              <a:t>8</a:t>
             </a:fld>
             <a:endParaRPr lang="en-US" b="1" dirty="0"/>
           </a:p>
@@ -10542,7 +11441,7 @@
 </p:sld>
 </file>
 
-<file path=ppt/slides/slide7.xml><?xml version="1.0" encoding="utf-8"?>
+<file path=ppt/slides/slide9.xml><?xml version="1.0" encoding="utf-8"?>
 <p:sld xmlns:a="http://schemas.openxmlformats.org/drawingml/2006/main" xmlns:r="http://schemas.openxmlformats.org/officeDocument/2006/relationships" xmlns:p="http://schemas.openxmlformats.org/presentationml/2006/main">
   <p:cSld>
     <p:spTree>
@@ -10615,7 +11514,7 @@
             <a:fld id="{D57F1E4F-1CFF-5643-939E-217C01CDF565}" type="slidenum">
               <a:rPr lang="en-US" b="1" smtClean="0"/>
               <a:pPr/>
-              <a:t>7</a:t>
+              <a:t>9</a:t>
             </a:fld>
             <a:endParaRPr lang="en-US" b="1" dirty="0"/>
           </a:p>
@@ -10673,7 +11572,7 @@
                   <a:schemeClr val="tx1"/>
                 </a:solidFill>
               </a:rPr>
-              <a:t>Eine logische Transaktion</a:t>
+              <a:t>Eine gemeinsame Transaktion</a:t>
             </a:r>
           </a:p>
           <a:p>
@@ -11203,387 +12102,6 @@
     <p:extLst>
       <p:ext uri="{BB962C8B-B14F-4D97-AF65-F5344CB8AC3E}">
         <p14:creationId xmlns:p14="http://schemas.microsoft.com/office/powerpoint/2010/main" val="3072086596"/>
-      </p:ext>
-    </p:extLst>
-  </p:cSld>
-  <p:clrMapOvr>
-    <a:masterClrMapping/>
-  </p:clrMapOvr>
-</p:sld>
-</file>
-
-<file path=ppt/slides/slide8.xml><?xml version="1.0" encoding="utf-8"?>
-<p:sld xmlns:a="http://schemas.openxmlformats.org/drawingml/2006/main" xmlns:r="http://schemas.openxmlformats.org/officeDocument/2006/relationships" xmlns:p="http://schemas.openxmlformats.org/presentationml/2006/main">
-  <p:cSld>
-    <p:spTree>
-      <p:nvGrpSpPr>
-        <p:cNvPr id="1" name=""/>
-        <p:cNvGrpSpPr/>
-        <p:nvPr/>
-      </p:nvGrpSpPr>
-      <p:grpSpPr>
-        <a:xfrm>
-          <a:off x="0" y="0"/>
-          <a:ext cx="0" cy="0"/>
-          <a:chOff x="0" y="0"/>
-          <a:chExt cx="0" cy="0"/>
-        </a:xfrm>
-      </p:grpSpPr>
-      <p:sp>
-        <p:nvSpPr>
-          <p:cNvPr id="2" name="Titel 1"/>
-          <p:cNvSpPr>
-            <a:spLocks noGrp="1"/>
-          </p:cNvSpPr>
-          <p:nvPr>
-            <p:ph type="title"/>
-          </p:nvPr>
-        </p:nvSpPr>
-        <p:spPr>
-          <a:xfrm>
-            <a:off x="0" y="0"/>
-            <a:ext cx="12192000" cy="990600"/>
-          </a:xfrm>
-        </p:spPr>
-        <p:txBody>
-          <a:bodyPr>
-            <a:normAutofit/>
-          </a:bodyPr>
-          <a:lstStyle/>
-          <a:p>
-            <a:pPr algn="ctr"/>
-            <a:r>
-              <a:rPr lang="de-DE" dirty="0"/>
-              <a:t>Mailing Prozess</a:t>
-            </a:r>
-          </a:p>
-        </p:txBody>
-      </p:sp>
-      <p:sp>
-        <p:nvSpPr>
-          <p:cNvPr id="7" name="Foliennummernplatzhalter 6"/>
-          <p:cNvSpPr>
-            <a:spLocks noGrp="1"/>
-          </p:cNvSpPr>
-          <p:nvPr>
-            <p:ph type="sldNum" sz="quarter" idx="12"/>
-          </p:nvPr>
-        </p:nvSpPr>
-        <p:spPr/>
-        <p:txBody>
-          <a:bodyPr/>
-          <a:lstStyle/>
-          <a:p>
-            <a:fld id="{D57F1E4F-1CFF-5643-939E-217C01CDF565}" type="slidenum">
-              <a:rPr lang="en-US" b="1" smtClean="0"/>
-              <a:pPr/>
-              <a:t>8</a:t>
-            </a:fld>
-            <a:endParaRPr lang="en-US" b="1" dirty="0"/>
-          </a:p>
-        </p:txBody>
-      </p:sp>
-      <p:pic>
-        <p:nvPicPr>
-          <p:cNvPr id="6" name="Grafik 5"/>
-          <p:cNvPicPr>
-            <a:picLocks noChangeAspect="1"/>
-          </p:cNvPicPr>
-          <p:nvPr/>
-        </p:nvPicPr>
-        <p:blipFill>
-          <a:blip r:embed="rId2"/>
-          <a:stretch>
-            <a:fillRect/>
-          </a:stretch>
-        </p:blipFill>
-        <p:spPr>
-          <a:xfrm>
-            <a:off x="1676399" y="990600"/>
-            <a:ext cx="8038051" cy="5891746"/>
-          </a:xfrm>
-          <a:prstGeom prst="rect">
-            <a:avLst/>
-          </a:prstGeom>
-        </p:spPr>
-      </p:pic>
-    </p:spTree>
-    <p:extLst>
-      <p:ext uri="{BB962C8B-B14F-4D97-AF65-F5344CB8AC3E}">
-        <p14:creationId xmlns:p14="http://schemas.microsoft.com/office/powerpoint/2010/main" val="697617532"/>
-      </p:ext>
-    </p:extLst>
-  </p:cSld>
-  <p:clrMapOvr>
-    <a:masterClrMapping/>
-  </p:clrMapOvr>
-</p:sld>
-</file>
-
-<file path=ppt/slides/slide9.xml><?xml version="1.0" encoding="utf-8"?>
-<p:sld xmlns:a="http://schemas.openxmlformats.org/drawingml/2006/main" xmlns:r="http://schemas.openxmlformats.org/officeDocument/2006/relationships" xmlns:p="http://schemas.openxmlformats.org/presentationml/2006/main">
-  <p:cSld>
-    <p:spTree>
-      <p:nvGrpSpPr>
-        <p:cNvPr id="1" name=""/>
-        <p:cNvGrpSpPr/>
-        <p:nvPr/>
-      </p:nvGrpSpPr>
-      <p:grpSpPr>
-        <a:xfrm>
-          <a:off x="0" y="0"/>
-          <a:ext cx="0" cy="0"/>
-          <a:chOff x="0" y="0"/>
-          <a:chExt cx="0" cy="0"/>
-        </a:xfrm>
-      </p:grpSpPr>
-      <p:sp>
-        <p:nvSpPr>
-          <p:cNvPr id="2" name="Titel 1"/>
-          <p:cNvSpPr>
-            <a:spLocks noGrp="1"/>
-          </p:cNvSpPr>
-          <p:nvPr>
-            <p:ph type="title"/>
-          </p:nvPr>
-        </p:nvSpPr>
-        <p:spPr>
-          <a:xfrm>
-            <a:off x="0" y="0"/>
-            <a:ext cx="12192000" cy="990600"/>
-          </a:xfrm>
-        </p:spPr>
-        <p:txBody>
-          <a:bodyPr>
-            <a:normAutofit/>
-          </a:bodyPr>
-          <a:lstStyle/>
-          <a:p>
-            <a:pPr algn="ctr"/>
-            <a:r>
-              <a:rPr lang="de-DE" i="1" dirty="0"/>
-              <a:t>E-Mail</a:t>
-            </a:r>
-            <a:r>
-              <a:rPr lang="de-DE" dirty="0"/>
-              <a:t>-Vorlagen</a:t>
-            </a:r>
-          </a:p>
-        </p:txBody>
-      </p:sp>
-      <p:sp>
-        <p:nvSpPr>
-          <p:cNvPr id="6" name="Foliennummernplatzhalter 5"/>
-          <p:cNvSpPr>
-            <a:spLocks noGrp="1"/>
-          </p:cNvSpPr>
-          <p:nvPr>
-            <p:ph type="sldNum" sz="quarter" idx="12"/>
-          </p:nvPr>
-        </p:nvSpPr>
-        <p:spPr/>
-        <p:txBody>
-          <a:bodyPr/>
-          <a:lstStyle/>
-          <a:p>
-            <a:fld id="{D57F1E4F-1CFF-5643-939E-217C01CDF565}" type="slidenum">
-              <a:rPr lang="en-US" b="1" smtClean="0"/>
-              <a:pPr/>
-              <a:t>9</a:t>
-            </a:fld>
-            <a:endParaRPr lang="en-US" b="1" dirty="0"/>
-          </a:p>
-        </p:txBody>
-      </p:sp>
-      <p:sp>
-        <p:nvSpPr>
-          <p:cNvPr id="8" name="Textplatzhalter 2"/>
-          <p:cNvSpPr>
-            <a:spLocks noGrp="1"/>
-          </p:cNvSpPr>
-          <p:nvPr>
-            <p:ph type="body" idx="1"/>
-          </p:nvPr>
-        </p:nvSpPr>
-        <p:spPr>
-          <a:xfrm>
-            <a:off x="7264606" y="990600"/>
-            <a:ext cx="4851194" cy="5753100"/>
-          </a:xfrm>
-        </p:spPr>
-        <p:txBody>
-          <a:bodyPr anchor="t">
-            <a:normAutofit/>
-          </a:bodyPr>
-          <a:lstStyle/>
-          <a:p>
-            <a:pPr marL="342900" indent="-342900">
-              <a:lnSpc>
-                <a:spcPct val="150000"/>
-              </a:lnSpc>
-              <a:buClrTx/>
-              <a:buFont typeface="Arial" panose="020B0604020202020204" pitchFamily="34" charset="0"/>
-              <a:buChar char="•"/>
-            </a:pPr>
-            <a:r>
-              <a:rPr lang="de-DE" sz="2000" dirty="0">
-                <a:solidFill>
-                  <a:schemeClr val="tx1"/>
-                </a:solidFill>
-              </a:rPr>
-              <a:t>Statische vorgegebene Variablen</a:t>
-            </a:r>
-          </a:p>
-          <a:p>
-            <a:pPr marL="342900" indent="-342900">
-              <a:lnSpc>
-                <a:spcPct val="150000"/>
-              </a:lnSpc>
-              <a:buClrTx/>
-              <a:buFont typeface="Arial" panose="020B0604020202020204" pitchFamily="34" charset="0"/>
-              <a:buChar char="•"/>
-            </a:pPr>
-            <a:r>
-              <a:rPr lang="de-DE" sz="2000" dirty="0">
-                <a:solidFill>
-                  <a:schemeClr val="tx1"/>
-                </a:solidFill>
-              </a:rPr>
-              <a:t>Variablen beliebig verwendbar in Vorlagen</a:t>
-            </a:r>
-          </a:p>
-          <a:p>
-            <a:pPr marL="342900" indent="-342900">
-              <a:lnSpc>
-                <a:spcPct val="150000"/>
-              </a:lnSpc>
-              <a:buClrTx/>
-              <a:buFont typeface="Arial" panose="020B0604020202020204" pitchFamily="34" charset="0"/>
-              <a:buChar char="•"/>
-            </a:pPr>
-            <a:r>
-              <a:rPr lang="de-DE" sz="2000" dirty="0">
-                <a:solidFill>
-                  <a:schemeClr val="tx1"/>
-                </a:solidFill>
-              </a:rPr>
-              <a:t>Trennung der Vorlage von den dynamische Daten</a:t>
-            </a:r>
-          </a:p>
-          <a:p>
-            <a:pPr marL="342900" indent="-342900">
-              <a:lnSpc>
-                <a:spcPct val="150000"/>
-              </a:lnSpc>
-              <a:buClrTx/>
-              <a:buFont typeface="Arial" panose="020B0604020202020204" pitchFamily="34" charset="0"/>
-              <a:buChar char="•"/>
-            </a:pPr>
-            <a:r>
-              <a:rPr lang="de-DE" sz="2000" dirty="0">
-                <a:solidFill>
-                  <a:schemeClr val="tx1"/>
-                </a:solidFill>
-              </a:rPr>
-              <a:t>Benutzerdefinierte Vorlagen</a:t>
-            </a:r>
-          </a:p>
-          <a:p>
-            <a:pPr marL="342900" indent="-342900">
-              <a:lnSpc>
-                <a:spcPct val="150000"/>
-              </a:lnSpc>
-              <a:buClrTx/>
-              <a:buFont typeface="Arial" panose="020B0604020202020204" pitchFamily="34" charset="0"/>
-              <a:buChar char="•"/>
-            </a:pPr>
-            <a:r>
-              <a:rPr lang="de-DE" sz="2000" dirty="0">
-                <a:solidFill>
-                  <a:schemeClr val="tx1"/>
-                </a:solidFill>
-              </a:rPr>
-              <a:t>Vorlagen zur Laufzeit änderbar</a:t>
-            </a:r>
-          </a:p>
-          <a:p>
-            <a:pPr marL="342900" indent="-342900">
-              <a:lnSpc>
-                <a:spcPct val="150000"/>
-              </a:lnSpc>
-              <a:buClrTx/>
-              <a:buFont typeface="Arial" panose="020B0604020202020204" pitchFamily="34" charset="0"/>
-              <a:buChar char="•"/>
-            </a:pPr>
-            <a:r>
-              <a:rPr lang="de-DE" sz="2000" dirty="0">
-                <a:solidFill>
-                  <a:schemeClr val="tx1"/>
-                </a:solidFill>
-              </a:rPr>
-              <a:t>Mehrsprachigkeit der Vorlagen</a:t>
-            </a:r>
-          </a:p>
-          <a:p>
-            <a:pPr marL="342900" indent="-342900">
-              <a:lnSpc>
-                <a:spcPct val="150000"/>
-              </a:lnSpc>
-              <a:buClrTx/>
-              <a:buFont typeface="Arial" panose="020B0604020202020204" pitchFamily="34" charset="0"/>
-              <a:buChar char="•"/>
-            </a:pPr>
-            <a:endParaRPr lang="de-DE" sz="2000" dirty="0">
-              <a:solidFill>
-                <a:schemeClr val="tx1"/>
-              </a:solidFill>
-            </a:endParaRPr>
-          </a:p>
-          <a:p>
-            <a:pPr marL="342900" indent="-342900">
-              <a:lnSpc>
-                <a:spcPct val="150000"/>
-              </a:lnSpc>
-              <a:buClrTx/>
-              <a:buFont typeface="Arial" panose="020B0604020202020204" pitchFamily="34" charset="0"/>
-              <a:buChar char="•"/>
-            </a:pPr>
-            <a:endParaRPr lang="de-DE" sz="2000" dirty="0">
-              <a:solidFill>
-                <a:schemeClr val="tx1"/>
-              </a:solidFill>
-            </a:endParaRPr>
-          </a:p>
-        </p:txBody>
-      </p:sp>
-      <p:pic>
-        <p:nvPicPr>
-          <p:cNvPr id="3" name="Grafik 2"/>
-          <p:cNvPicPr>
-            <a:picLocks noChangeAspect="1"/>
-          </p:cNvPicPr>
-          <p:nvPr/>
-        </p:nvPicPr>
-        <p:blipFill>
-          <a:blip r:embed="rId2"/>
-          <a:stretch>
-            <a:fillRect/>
-          </a:stretch>
-        </p:blipFill>
-        <p:spPr>
-          <a:xfrm>
-            <a:off x="1676400" y="1297832"/>
-            <a:ext cx="5471130" cy="4262336"/>
-          </a:xfrm>
-          <a:prstGeom prst="rect">
-            <a:avLst/>
-          </a:prstGeom>
-        </p:spPr>
-      </p:pic>
-    </p:spTree>
-    <p:extLst>
-      <p:ext uri="{BB962C8B-B14F-4D97-AF65-F5344CB8AC3E}">
-        <p14:creationId xmlns:p14="http://schemas.microsoft.com/office/powerpoint/2010/main" val="3173056318"/>
       </p:ext>
     </p:extLst>
   </p:cSld>

</xml_diff>